<commit_message>
add functions from difficulty task
</commit_message>
<xml_diff>
--- a/ChaseLabDataPipeline.pptx
+++ b/ChaseLabDataPipeline.pptx
@@ -264,7 +264,7 @@
           <a:p>
             <a:fld id="{5DD24982-12B7-48A6-9BC1-2670228BB022}" type="datetimeFigureOut">
               <a:rPr lang="en-US" smtClean="0"/>
-              <a:t>1/16/2023</a:t>
+              <a:t>1/20/2023</a:t>
             </a:fld>
             <a:endParaRPr lang="en-US"/>
           </a:p>
@@ -496,7 +496,7 @@
           <a:p>
             <a:fld id="{5DD24982-12B7-48A6-9BC1-2670228BB022}" type="datetimeFigureOut">
               <a:rPr lang="en-US" smtClean="0"/>
-              <a:t>1/16/2023</a:t>
+              <a:t>1/20/2023</a:t>
             </a:fld>
             <a:endParaRPr lang="en-US"/>
           </a:p>
@@ -738,7 +738,7 @@
           <a:p>
             <a:fld id="{5DD24982-12B7-48A6-9BC1-2670228BB022}" type="datetimeFigureOut">
               <a:rPr lang="en-US" smtClean="0"/>
-              <a:t>1/16/2023</a:t>
+              <a:t>1/20/2023</a:t>
             </a:fld>
             <a:endParaRPr lang="en-US"/>
           </a:p>
@@ -970,7 +970,7 @@
           <a:p>
             <a:fld id="{5DD24982-12B7-48A6-9BC1-2670228BB022}" type="datetimeFigureOut">
               <a:rPr lang="en-US" smtClean="0"/>
-              <a:t>1/16/2023</a:t>
+              <a:t>1/20/2023</a:t>
             </a:fld>
             <a:endParaRPr lang="en-US"/>
           </a:p>
@@ -1246,7 +1246,7 @@
           <a:p>
             <a:fld id="{5DD24982-12B7-48A6-9BC1-2670228BB022}" type="datetimeFigureOut">
               <a:rPr lang="en-US" smtClean="0"/>
-              <a:t>1/16/2023</a:t>
+              <a:t>1/20/2023</a:t>
             </a:fld>
             <a:endParaRPr lang="en-US"/>
           </a:p>
@@ -1578,7 +1578,7 @@
           <a:p>
             <a:fld id="{5DD24982-12B7-48A6-9BC1-2670228BB022}" type="datetimeFigureOut">
               <a:rPr lang="en-US" smtClean="0"/>
-              <a:t>1/16/2023</a:t>
+              <a:t>1/20/2023</a:t>
             </a:fld>
             <a:endParaRPr lang="en-US"/>
           </a:p>
@@ -2057,7 +2057,7 @@
           <a:p>
             <a:fld id="{5DD24982-12B7-48A6-9BC1-2670228BB022}" type="datetimeFigureOut">
               <a:rPr lang="en-US" smtClean="0"/>
-              <a:t>1/16/2023</a:t>
+              <a:t>1/20/2023</a:t>
             </a:fld>
             <a:endParaRPr lang="en-US"/>
           </a:p>
@@ -2199,7 +2199,7 @@
           <a:p>
             <a:fld id="{5DD24982-12B7-48A6-9BC1-2670228BB022}" type="datetimeFigureOut">
               <a:rPr lang="en-US" smtClean="0"/>
-              <a:t>1/16/2023</a:t>
+              <a:t>1/20/2023</a:t>
             </a:fld>
             <a:endParaRPr lang="en-US"/>
           </a:p>
@@ -2312,7 +2312,7 @@
           <a:p>
             <a:fld id="{5DD24982-12B7-48A6-9BC1-2670228BB022}" type="datetimeFigureOut">
               <a:rPr lang="en-US" smtClean="0"/>
-              <a:t>1/16/2023</a:t>
+              <a:t>1/20/2023</a:t>
             </a:fld>
             <a:endParaRPr lang="en-US"/>
           </a:p>
@@ -2657,7 +2657,7 @@
           <a:p>
             <a:fld id="{5DD24982-12B7-48A6-9BC1-2670228BB022}" type="datetimeFigureOut">
               <a:rPr lang="en-US" smtClean="0"/>
-              <a:t>1/16/2023</a:t>
+              <a:t>1/20/2023</a:t>
             </a:fld>
             <a:endParaRPr lang="en-US"/>
           </a:p>
@@ -2946,7 +2946,7 @@
           <a:p>
             <a:fld id="{5DD24982-12B7-48A6-9BC1-2670228BB022}" type="datetimeFigureOut">
               <a:rPr lang="en-US" smtClean="0"/>
-              <a:t>1/16/2023</a:t>
+              <a:t>1/20/2023</a:t>
             </a:fld>
             <a:endParaRPr lang="en-US"/>
           </a:p>
@@ -3221,7 +3221,7 @@
           <a:p>
             <a:fld id="{5DD24982-12B7-48A6-9BC1-2670228BB022}" type="datetimeFigureOut">
               <a:rPr lang="en-US" smtClean="0"/>
-              <a:t>1/16/2023</a:t>
+              <a:t>1/20/2023</a:t>
             </a:fld>
             <a:endParaRPr lang="en-US"/>
           </a:p>
@@ -5918,10 +5918,10 @@
       </p:sp>
       <p:sp>
         <p:nvSpPr>
-          <p:cNvPr id="13" name="正方形/長方形 12">
-            <a:extLst>
-              <a:ext uri="{FF2B5EF4-FFF2-40B4-BE49-F238E27FC236}">
-                <a16:creationId xmlns:a16="http://schemas.microsoft.com/office/drawing/2014/main" id="{EF6A4AC6-6AC7-40B4-046F-364DE8205BA8}"/>
+          <p:cNvPr id="14" name="正方形/長方形 13">
+            <a:extLst>
+              <a:ext uri="{FF2B5EF4-FFF2-40B4-BE49-F238E27FC236}">
+                <a16:creationId xmlns:a16="http://schemas.microsoft.com/office/drawing/2014/main" id="{4A1BA4A6-63EF-0861-1188-2A576839AF7E}"/>
               </a:ext>
             </a:extLst>
           </p:cNvPr>
@@ -5930,7 +5930,7 @@
         </p:nvSpPr>
         <p:spPr>
           <a:xfrm>
-            <a:off x="167780" y="1993909"/>
+            <a:off x="167780" y="1974243"/>
             <a:ext cx="3011647" cy="654341"/>
           </a:xfrm>
           <a:prstGeom prst="rect">
@@ -5974,7 +5974,7 @@
                 <a:latin typeface="Arial" panose="020B0604020202020204" pitchFamily="34" charset="0"/>
                 <a:cs typeface="Arial" panose="020B0604020202020204" pitchFamily="34" charset="0"/>
               </a:rPr>
-              <a:t>wrapper_preprocessTaskAndKinematicData_choking</a:t>
+              <a:t>RockyDataPreprocessing</a:t>
             </a:r>
             <a:endParaRPr lang="en-US" sz="1400" b="1" dirty="0">
               <a:solidFill>
@@ -5994,17 +5994,34 @@
                 <a:latin typeface="Arial" panose="020B0604020202020204" pitchFamily="34" charset="0"/>
                 <a:cs typeface="Arial" panose="020B0604020202020204" pitchFamily="34" charset="0"/>
               </a:rPr>
-              <a:t>Make synchronized data</a:t>
-            </a:r>
-          </a:p>
-        </p:txBody>
-      </p:sp>
-      <p:sp>
-        <p:nvSpPr>
-          <p:cNvPr id="14" name="正方形/長方形 13">
-            <a:extLst>
-              <a:ext uri="{FF2B5EF4-FFF2-40B4-BE49-F238E27FC236}">
-                <a16:creationId xmlns:a16="http://schemas.microsoft.com/office/drawing/2014/main" id="{4A1BA4A6-63EF-0861-1188-2A576839AF7E}"/>
+              <a:t>Make preprocessed </a:t>
+            </a:r>
+            <a:r>
+              <a:rPr lang="en-US" sz="1400" dirty="0" err="1">
+                <a:solidFill>
+                  <a:schemeClr val="tx1"/>
+                </a:solidFill>
+                <a:latin typeface="Arial" panose="020B0604020202020204" pitchFamily="34" charset="0"/>
+                <a:cs typeface="Arial" panose="020B0604020202020204" pitchFamily="34" charset="0"/>
+              </a:rPr>
+              <a:t>datas</a:t>
+            </a:r>
+            <a:endParaRPr lang="en-US" sz="1400" dirty="0">
+              <a:solidFill>
+                <a:schemeClr val="tx1"/>
+              </a:solidFill>
+              <a:latin typeface="Arial" panose="020B0604020202020204" pitchFamily="34" charset="0"/>
+              <a:cs typeface="Arial" panose="020B0604020202020204" pitchFamily="34" charset="0"/>
+            </a:endParaRPr>
+          </a:p>
+        </p:txBody>
+      </p:sp>
+      <p:sp>
+        <p:nvSpPr>
+          <p:cNvPr id="2" name="正方形/長方形 1">
+            <a:extLst>
+              <a:ext uri="{FF2B5EF4-FFF2-40B4-BE49-F238E27FC236}">
+                <a16:creationId xmlns:a16="http://schemas.microsoft.com/office/drawing/2014/main" id="{91A82E68-C1C8-B273-A890-1BB729468AF4}"/>
               </a:ext>
             </a:extLst>
           </p:cNvPr>
@@ -6013,7 +6030,7 @@
         </p:nvSpPr>
         <p:spPr>
           <a:xfrm>
-            <a:off x="167780" y="2813143"/>
+            <a:off x="167780" y="2793477"/>
             <a:ext cx="3011647" cy="654341"/>
           </a:xfrm>
           <a:prstGeom prst="rect">
@@ -6057,7 +6074,7 @@
                 <a:latin typeface="Arial" panose="020B0604020202020204" pitchFamily="34" charset="0"/>
                 <a:cs typeface="Arial" panose="020B0604020202020204" pitchFamily="34" charset="0"/>
               </a:rPr>
-              <a:t>RockyDataPreprocessing</a:t>
+              <a:t>CombineTrialData</a:t>
             </a:r>
             <a:endParaRPr lang="en-US" sz="1400" b="1" dirty="0">
               <a:solidFill>
@@ -6077,34 +6094,17 @@
                 <a:latin typeface="Arial" panose="020B0604020202020204" pitchFamily="34" charset="0"/>
                 <a:cs typeface="Arial" panose="020B0604020202020204" pitchFamily="34" charset="0"/>
               </a:rPr>
-              <a:t>Make preprocessed </a:t>
-            </a:r>
-            <a:r>
-              <a:rPr lang="en-US" sz="1400" dirty="0" err="1">
-                <a:solidFill>
-                  <a:schemeClr val="tx1"/>
-                </a:solidFill>
-                <a:latin typeface="Arial" panose="020B0604020202020204" pitchFamily="34" charset="0"/>
-                <a:cs typeface="Arial" panose="020B0604020202020204" pitchFamily="34" charset="0"/>
-              </a:rPr>
-              <a:t>datas</a:t>
-            </a:r>
-            <a:endParaRPr lang="en-US" sz="1400" dirty="0">
-              <a:solidFill>
-                <a:schemeClr val="tx1"/>
-              </a:solidFill>
-              <a:latin typeface="Arial" panose="020B0604020202020204" pitchFamily="34" charset="0"/>
-              <a:cs typeface="Arial" panose="020B0604020202020204" pitchFamily="34" charset="0"/>
-            </a:endParaRPr>
-          </a:p>
-        </p:txBody>
-      </p:sp>
-      <p:sp>
-        <p:nvSpPr>
-          <p:cNvPr id="2" name="正方形/長方形 1">
-            <a:extLst>
-              <a:ext uri="{FF2B5EF4-FFF2-40B4-BE49-F238E27FC236}">
-                <a16:creationId xmlns:a16="http://schemas.microsoft.com/office/drawing/2014/main" id="{91A82E68-C1C8-B273-A890-1BB729468AF4}"/>
+              <a:t>Make own dataset based on ones interest</a:t>
+            </a:r>
+          </a:p>
+        </p:txBody>
+      </p:sp>
+      <p:sp>
+        <p:nvSpPr>
+          <p:cNvPr id="3" name="正方形/長方形 2">
+            <a:extLst>
+              <a:ext uri="{FF2B5EF4-FFF2-40B4-BE49-F238E27FC236}">
+                <a16:creationId xmlns:a16="http://schemas.microsoft.com/office/drawing/2014/main" id="{7F0083C5-EEF2-87FF-4104-33F28DB00C0F}"/>
               </a:ext>
             </a:extLst>
           </p:cNvPr>
@@ -6113,90 +6113,7 @@
         </p:nvSpPr>
         <p:spPr>
           <a:xfrm>
-            <a:off x="167780" y="3632377"/>
-            <a:ext cx="3011647" cy="654341"/>
-          </a:xfrm>
-          <a:prstGeom prst="rect">
-            <a:avLst/>
-          </a:prstGeom>
-          <a:solidFill>
-            <a:schemeClr val="bg1"/>
-          </a:solidFill>
-          <a:ln>
-            <a:solidFill>
-              <a:schemeClr val="tx1"/>
-            </a:solidFill>
-          </a:ln>
-        </p:spPr>
-        <p:style>
-          <a:lnRef idx="2">
-            <a:schemeClr val="accent1">
-              <a:shade val="50000"/>
-            </a:schemeClr>
-          </a:lnRef>
-          <a:fillRef idx="1">
-            <a:schemeClr val="accent1"/>
-          </a:fillRef>
-          <a:effectRef idx="0">
-            <a:schemeClr val="accent1"/>
-          </a:effectRef>
-          <a:fontRef idx="minor">
-            <a:schemeClr val="lt1"/>
-          </a:fontRef>
-        </p:style>
-        <p:txBody>
-          <a:bodyPr rtlCol="0" anchor="ctr"/>
-          <a:lstStyle/>
-          <a:p>
-            <a:pPr algn="ctr"/>
-            <a:r>
-              <a:rPr lang="en-US" sz="1400" b="1" dirty="0" err="1">
-                <a:solidFill>
-                  <a:schemeClr val="tx1"/>
-                </a:solidFill>
-                <a:latin typeface="Arial" panose="020B0604020202020204" pitchFamily="34" charset="0"/>
-                <a:cs typeface="Arial" panose="020B0604020202020204" pitchFamily="34" charset="0"/>
-              </a:rPr>
-              <a:t>CombineTrialData</a:t>
-            </a:r>
-            <a:endParaRPr lang="en-US" sz="1400" b="1" dirty="0">
-              <a:solidFill>
-                <a:schemeClr val="tx1"/>
-              </a:solidFill>
-              <a:latin typeface="Arial" panose="020B0604020202020204" pitchFamily="34" charset="0"/>
-              <a:cs typeface="Arial" panose="020B0604020202020204" pitchFamily="34" charset="0"/>
-            </a:endParaRPr>
-          </a:p>
-          <a:p>
-            <a:pPr algn="ctr"/>
-            <a:r>
-              <a:rPr lang="en-US" sz="1400" dirty="0">
-                <a:solidFill>
-                  <a:schemeClr val="tx1"/>
-                </a:solidFill>
-                <a:latin typeface="Arial" panose="020B0604020202020204" pitchFamily="34" charset="0"/>
-                <a:cs typeface="Arial" panose="020B0604020202020204" pitchFamily="34" charset="0"/>
-              </a:rPr>
-              <a:t>Make own dataset based on ones interest</a:t>
-            </a:r>
-          </a:p>
-        </p:txBody>
-      </p:sp>
-      <p:sp>
-        <p:nvSpPr>
-          <p:cNvPr id="3" name="正方形/長方形 2">
-            <a:extLst>
-              <a:ext uri="{FF2B5EF4-FFF2-40B4-BE49-F238E27FC236}">
-                <a16:creationId xmlns:a16="http://schemas.microsoft.com/office/drawing/2014/main" id="{7F0083C5-EEF2-87FF-4104-33F28DB00C0F}"/>
-              </a:ext>
-            </a:extLst>
-          </p:cNvPr>
-          <p:cNvSpPr/>
-          <p:nvPr/>
-        </p:nvSpPr>
-        <p:spPr>
-          <a:xfrm>
-            <a:off x="3591887" y="1317558"/>
+            <a:off x="3591887" y="4555712"/>
             <a:ext cx="3706535" cy="2149925"/>
           </a:xfrm>
           <a:prstGeom prst="rect">
@@ -6400,49 +6317,6 @@
           </a:p>
         </p:txBody>
       </p:sp>
-      <p:cxnSp>
-        <p:nvCxnSpPr>
-          <p:cNvPr id="6" name="直線矢印コネクタ 5">
-            <a:extLst>
-              <a:ext uri="{FF2B5EF4-FFF2-40B4-BE49-F238E27FC236}">
-                <a16:creationId xmlns:a16="http://schemas.microsoft.com/office/drawing/2014/main" id="{7581E671-CDA8-97E6-DB30-F9C73229E40F}"/>
-              </a:ext>
-            </a:extLst>
-          </p:cNvPr>
-          <p:cNvCxnSpPr>
-            <a:cxnSpLocks/>
-            <a:stCxn id="3" idx="1"/>
-            <a:endCxn id="14" idx="3"/>
-          </p:cNvCxnSpPr>
-          <p:nvPr/>
-        </p:nvCxnSpPr>
-        <p:spPr>
-          <a:xfrm flipH="1">
-            <a:off x="3179427" y="2392521"/>
-            <a:ext cx="412460" cy="747793"/>
-          </a:xfrm>
-          <a:prstGeom prst="straightConnector1">
-            <a:avLst/>
-          </a:prstGeom>
-          <a:ln w="19050">
-            <a:tailEnd type="triangle"/>
-          </a:ln>
-        </p:spPr>
-        <p:style>
-          <a:lnRef idx="1">
-            <a:schemeClr val="dk1"/>
-          </a:lnRef>
-          <a:fillRef idx="0">
-            <a:schemeClr val="dk1"/>
-          </a:fillRef>
-          <a:effectRef idx="0">
-            <a:schemeClr val="dk1"/>
-          </a:effectRef>
-          <a:fontRef idx="minor">
-            <a:schemeClr val="tx1"/>
-          </a:fontRef>
-        </p:style>
-      </p:cxnSp>
       <p:sp>
         <p:nvSpPr>
           <p:cNvPr id="7" name="正方形/長方形 6">
@@ -6457,7 +6331,7 @@
         </p:nvSpPr>
         <p:spPr>
           <a:xfrm>
-            <a:off x="3405930" y="1174675"/>
+            <a:off x="3405930" y="4412829"/>
             <a:ext cx="8482672" cy="2357091"/>
           </a:xfrm>
           <a:prstGeom prst="rect">
@@ -6510,7 +6384,7 @@
         </p:nvSpPr>
         <p:spPr>
           <a:xfrm>
-            <a:off x="3498208" y="1009781"/>
+            <a:off x="3498208" y="4247935"/>
             <a:ext cx="2449585" cy="307777"/>
           </a:xfrm>
           <a:prstGeom prst="rect">
@@ -6561,7 +6435,7 @@
         </p:nvSpPr>
         <p:spPr>
           <a:xfrm>
-            <a:off x="7997505" y="1317558"/>
+            <a:off x="7997505" y="4555712"/>
             <a:ext cx="3706535" cy="2149925"/>
           </a:xfrm>
           <a:prstGeom prst="rect">
@@ -6868,7 +6742,7 @@
         </p:nvCxnSpPr>
         <p:spPr>
           <a:xfrm>
-            <a:off x="7298422" y="2392521"/>
+            <a:off x="7298422" y="5630675"/>
             <a:ext cx="699083" cy="0"/>
           </a:xfrm>
           <a:prstGeom prst="straightConnector1">
@@ -6894,6 +6768,348 @@
           </a:fontRef>
         </p:style>
       </p:cxnSp>
+      <p:sp>
+        <p:nvSpPr>
+          <p:cNvPr id="5" name="正方形/長方形 4">
+            <a:extLst>
+              <a:ext uri="{FF2B5EF4-FFF2-40B4-BE49-F238E27FC236}">
+                <a16:creationId xmlns:a16="http://schemas.microsoft.com/office/drawing/2014/main" id="{E38466DE-DD45-D183-B015-CC32345746C3}"/>
+              </a:ext>
+            </a:extLst>
+          </p:cNvPr>
+          <p:cNvSpPr/>
+          <p:nvPr/>
+        </p:nvSpPr>
+        <p:spPr>
+          <a:xfrm>
+            <a:off x="3621949" y="1338666"/>
+            <a:ext cx="8082091" cy="2149925"/>
+          </a:xfrm>
+          <a:prstGeom prst="rect">
+            <a:avLst/>
+          </a:prstGeom>
+          <a:solidFill>
+            <a:schemeClr val="bg1"/>
+          </a:solidFill>
+          <a:ln>
+            <a:solidFill>
+              <a:schemeClr val="tx1"/>
+            </a:solidFill>
+          </a:ln>
+        </p:spPr>
+        <p:style>
+          <a:lnRef idx="2">
+            <a:schemeClr val="accent1">
+              <a:shade val="50000"/>
+            </a:schemeClr>
+          </a:lnRef>
+          <a:fillRef idx="1">
+            <a:schemeClr val="accent1"/>
+          </a:fillRef>
+          <a:effectRef idx="0">
+            <a:schemeClr val="accent1"/>
+          </a:effectRef>
+          <a:fontRef idx="minor">
+            <a:schemeClr val="lt1"/>
+          </a:fontRef>
+        </p:style>
+        <p:txBody>
+          <a:bodyPr rtlCol="0" anchor="ctr"/>
+          <a:lstStyle/>
+          <a:p>
+            <a:pPr marL="342900" indent="-342900">
+              <a:buAutoNum type="arabicPeriod"/>
+            </a:pPr>
+            <a:r>
+              <a:rPr lang="en-US" altLang="ja-JP" sz="1400" b="1" dirty="0">
+                <a:solidFill>
+                  <a:schemeClr val="tx1"/>
+                </a:solidFill>
+                <a:latin typeface="Arial" panose="020B0604020202020204" pitchFamily="34" charset="0"/>
+                <a:cs typeface="Arial" panose="020B0604020202020204" pitchFamily="34" charset="0"/>
+              </a:rPr>
+              <a:t>Separate data into trials : </a:t>
+            </a:r>
+            <a:r>
+              <a:rPr lang="en-US" altLang="ja-JP" sz="1400" b="1" dirty="0" err="1">
+                <a:solidFill>
+                  <a:schemeClr val="tx1"/>
+                </a:solidFill>
+                <a:latin typeface="Arial" panose="020B0604020202020204" pitchFamily="34" charset="0"/>
+                <a:cs typeface="Arial" panose="020B0604020202020204" pitchFamily="34" charset="0"/>
+              </a:rPr>
+              <a:t>pp_preprocessTaskAndKinematicData</a:t>
+            </a:r>
+            <a:r>
+              <a:rPr lang="en-US" altLang="ja-JP" sz="1400" b="1" dirty="0">
+                <a:solidFill>
+                  <a:schemeClr val="tx1"/>
+                </a:solidFill>
+                <a:latin typeface="Arial" panose="020B0604020202020204" pitchFamily="34" charset="0"/>
+                <a:cs typeface="Arial" panose="020B0604020202020204" pitchFamily="34" charset="0"/>
+              </a:rPr>
+              <a:t> </a:t>
+            </a:r>
+          </a:p>
+          <a:p>
+            <a:pPr marL="342900" indent="-342900">
+              <a:buAutoNum type="arabicPeriod"/>
+            </a:pPr>
+            <a:r>
+              <a:rPr lang="en-US" altLang="ja-JP" sz="1400" b="1" dirty="0">
+                <a:solidFill>
+                  <a:schemeClr val="tx1"/>
+                </a:solidFill>
+                <a:latin typeface="Arial" panose="020B0604020202020204" pitchFamily="34" charset="0"/>
+                <a:cs typeface="Arial" panose="020B0604020202020204" pitchFamily="34" charset="0"/>
+              </a:rPr>
+              <a:t>Align hand data : </a:t>
+            </a:r>
+            <a:r>
+              <a:rPr lang="en-US" altLang="ja-JP" sz="1400" b="1" dirty="0" err="1">
+                <a:solidFill>
+                  <a:schemeClr val="tx1"/>
+                </a:solidFill>
+                <a:latin typeface="Arial" panose="020B0604020202020204" pitchFamily="34" charset="0"/>
+                <a:cs typeface="Arial" panose="020B0604020202020204" pitchFamily="34" charset="0"/>
+              </a:rPr>
+              <a:t>pp_preprocessTaskAndKinematicData</a:t>
+            </a:r>
+            <a:endParaRPr lang="en-US" altLang="ja-JP" sz="1400" b="1" dirty="0">
+              <a:solidFill>
+                <a:schemeClr val="tx1"/>
+              </a:solidFill>
+              <a:latin typeface="Arial" panose="020B0604020202020204" pitchFamily="34" charset="0"/>
+              <a:cs typeface="Arial" panose="020B0604020202020204" pitchFamily="34" charset="0"/>
+            </a:endParaRPr>
+          </a:p>
+          <a:p>
+            <a:pPr marL="342900" indent="-342900">
+              <a:buAutoNum type="arabicPeriod"/>
+            </a:pPr>
+            <a:r>
+              <a:rPr lang="en-US" altLang="ja-JP" sz="1400" b="1" dirty="0">
+                <a:solidFill>
+                  <a:schemeClr val="tx1"/>
+                </a:solidFill>
+                <a:latin typeface="Arial" panose="020B0604020202020204" pitchFamily="34" charset="0"/>
+                <a:cs typeface="Arial" panose="020B0604020202020204" pitchFamily="34" charset="0"/>
+              </a:rPr>
+              <a:t>Align Spike data : </a:t>
+            </a:r>
+            <a:r>
+              <a:rPr lang="en-US" altLang="ja-JP" sz="1400" b="1" dirty="0" err="1">
+                <a:solidFill>
+                  <a:schemeClr val="tx1"/>
+                </a:solidFill>
+                <a:latin typeface="Arial" panose="020B0604020202020204" pitchFamily="34" charset="0"/>
+                <a:cs typeface="Arial" panose="020B0604020202020204" pitchFamily="34" charset="0"/>
+              </a:rPr>
+              <a:t>pp_spikeAlignmentToTrial</a:t>
+            </a:r>
+            <a:r>
+              <a:rPr lang="en-US" altLang="ja-JP" sz="1400" b="1" dirty="0">
+                <a:solidFill>
+                  <a:schemeClr val="tx1"/>
+                </a:solidFill>
+                <a:latin typeface="Arial" panose="020B0604020202020204" pitchFamily="34" charset="0"/>
+                <a:cs typeface="Arial" panose="020B0604020202020204" pitchFamily="34" charset="0"/>
+              </a:rPr>
+              <a:t> + p1_spikePreprocessing</a:t>
+            </a:r>
+          </a:p>
+          <a:p>
+            <a:pPr marL="342900" indent="-342900">
+              <a:buFont typeface="+mj-lt"/>
+              <a:buAutoNum type="arabicPeriod"/>
+            </a:pPr>
+            <a:r>
+              <a:rPr lang="en-US" altLang="ja-JP" sz="1400" b="1" dirty="0">
+                <a:solidFill>
+                  <a:schemeClr val="tx1"/>
+                </a:solidFill>
+                <a:latin typeface="Arial" panose="020B0604020202020204" pitchFamily="34" charset="0"/>
+                <a:cs typeface="Arial" panose="020B0604020202020204" pitchFamily="34" charset="0"/>
+              </a:rPr>
+              <a:t>Align EMG/ECG data : </a:t>
+            </a:r>
+            <a:r>
+              <a:rPr lang="en-US" altLang="ja-JP" sz="1400" b="1" dirty="0" err="1">
+                <a:solidFill>
+                  <a:schemeClr val="tx1"/>
+                </a:solidFill>
+                <a:latin typeface="Arial" panose="020B0604020202020204" pitchFamily="34" charset="0"/>
+                <a:cs typeface="Arial" panose="020B0604020202020204" pitchFamily="34" charset="0"/>
+              </a:rPr>
+              <a:t>pp_emgPreprocess</a:t>
+            </a:r>
+            <a:r>
+              <a:rPr lang="en-US" altLang="ja-JP" sz="1400" b="1" dirty="0">
+                <a:solidFill>
+                  <a:schemeClr val="tx1"/>
+                </a:solidFill>
+                <a:latin typeface="Arial" panose="020B0604020202020204" pitchFamily="34" charset="0"/>
+                <a:cs typeface="Arial" panose="020B0604020202020204" pitchFamily="34" charset="0"/>
+              </a:rPr>
+              <a:t> + </a:t>
+            </a:r>
+            <a:r>
+              <a:rPr lang="en-US" altLang="ja-JP" sz="1400" b="1" dirty="0" err="1">
+                <a:solidFill>
+                  <a:schemeClr val="tx1"/>
+                </a:solidFill>
+                <a:latin typeface="Arial" panose="020B0604020202020204" pitchFamily="34" charset="0"/>
+                <a:cs typeface="Arial" panose="020B0604020202020204" pitchFamily="34" charset="0"/>
+              </a:rPr>
+              <a:t>pp_emgNormalization</a:t>
+            </a:r>
+            <a:endParaRPr lang="en-US" altLang="ja-JP" sz="1400" b="1" dirty="0">
+              <a:solidFill>
+                <a:schemeClr val="tx1"/>
+              </a:solidFill>
+              <a:latin typeface="Arial" panose="020B0604020202020204" pitchFamily="34" charset="0"/>
+              <a:cs typeface="Arial" panose="020B0604020202020204" pitchFamily="34" charset="0"/>
+            </a:endParaRPr>
+          </a:p>
+          <a:p>
+            <a:pPr marL="342900" indent="-342900">
+              <a:buFont typeface="+mj-lt"/>
+              <a:buAutoNum type="arabicPeriod"/>
+            </a:pPr>
+            <a:r>
+              <a:rPr lang="en-US" altLang="ja-JP" sz="1400" b="1" dirty="0">
+                <a:solidFill>
+                  <a:schemeClr val="tx1"/>
+                </a:solidFill>
+                <a:latin typeface="Arial" panose="020B0604020202020204" pitchFamily="34" charset="0"/>
+                <a:cs typeface="Arial" panose="020B0604020202020204" pitchFamily="34" charset="0"/>
+              </a:rPr>
+              <a:t>Align Pupil data : </a:t>
+            </a:r>
+            <a:r>
+              <a:rPr lang="en-US" altLang="ja-JP" sz="1400" b="1" dirty="0" err="1">
+                <a:solidFill>
+                  <a:schemeClr val="tx1"/>
+                </a:solidFill>
+                <a:latin typeface="Arial" panose="020B0604020202020204" pitchFamily="34" charset="0"/>
+                <a:cs typeface="Arial" panose="020B0604020202020204" pitchFamily="34" charset="0"/>
+              </a:rPr>
+              <a:t>pp_pupilPreprocess</a:t>
+            </a:r>
+            <a:endParaRPr lang="en-US" altLang="ja-JP" sz="1400" b="1" dirty="0">
+              <a:solidFill>
+                <a:schemeClr val="tx1"/>
+              </a:solidFill>
+              <a:latin typeface="Arial" panose="020B0604020202020204" pitchFamily="34" charset="0"/>
+              <a:cs typeface="Arial" panose="020B0604020202020204" pitchFamily="34" charset="0"/>
+            </a:endParaRPr>
+          </a:p>
+        </p:txBody>
+      </p:sp>
+      <p:sp>
+        <p:nvSpPr>
+          <p:cNvPr id="11" name="正方形/長方形 10">
+            <a:extLst>
+              <a:ext uri="{FF2B5EF4-FFF2-40B4-BE49-F238E27FC236}">
+                <a16:creationId xmlns:a16="http://schemas.microsoft.com/office/drawing/2014/main" id="{9519DC1E-EFF1-D8BB-500B-D747858BE5BE}"/>
+              </a:ext>
+            </a:extLst>
+          </p:cNvPr>
+          <p:cNvSpPr/>
+          <p:nvPr/>
+        </p:nvSpPr>
+        <p:spPr>
+          <a:xfrm>
+            <a:off x="3435992" y="1195783"/>
+            <a:ext cx="8482672" cy="2357091"/>
+          </a:xfrm>
+          <a:prstGeom prst="rect">
+            <a:avLst/>
+          </a:prstGeom>
+          <a:noFill/>
+          <a:ln w="19050">
+            <a:solidFill>
+              <a:schemeClr val="tx1"/>
+            </a:solidFill>
+            <a:prstDash val="sysDot"/>
+          </a:ln>
+        </p:spPr>
+        <p:style>
+          <a:lnRef idx="2">
+            <a:schemeClr val="accent1">
+              <a:shade val="50000"/>
+            </a:schemeClr>
+          </a:lnRef>
+          <a:fillRef idx="1">
+            <a:schemeClr val="accent1"/>
+          </a:fillRef>
+          <a:effectRef idx="0">
+            <a:schemeClr val="accent1"/>
+          </a:effectRef>
+          <a:fontRef idx="minor">
+            <a:schemeClr val="lt1"/>
+          </a:fontRef>
+        </p:style>
+        <p:txBody>
+          <a:bodyPr rtlCol="0" anchor="ctr"/>
+          <a:lstStyle/>
+          <a:p>
+            <a:pPr algn="ctr"/>
+            <a:endParaRPr lang="en-US"/>
+          </a:p>
+        </p:txBody>
+      </p:sp>
+      <p:sp>
+        <p:nvSpPr>
+          <p:cNvPr id="12" name="テキスト ボックス 11">
+            <a:extLst>
+              <a:ext uri="{FF2B5EF4-FFF2-40B4-BE49-F238E27FC236}">
+                <a16:creationId xmlns:a16="http://schemas.microsoft.com/office/drawing/2014/main" id="{AFE17303-A825-E6DE-1104-BBEB10EAB8BA}"/>
+              </a:ext>
+            </a:extLst>
+          </p:cNvPr>
+          <p:cNvSpPr txBox="1"/>
+          <p:nvPr/>
+        </p:nvSpPr>
+        <p:spPr>
+          <a:xfrm>
+            <a:off x="3528270" y="1030889"/>
+            <a:ext cx="2449585" cy="307777"/>
+          </a:xfrm>
+          <a:prstGeom prst="rect">
+            <a:avLst/>
+          </a:prstGeom>
+          <a:solidFill>
+            <a:schemeClr val="bg1"/>
+          </a:solidFill>
+        </p:spPr>
+        <p:txBody>
+          <a:bodyPr wrap="square" rtlCol="0">
+            <a:spAutoFit/>
+          </a:bodyPr>
+          <a:lstStyle/>
+          <a:p>
+            <a:pPr algn="ctr"/>
+            <a:r>
+              <a:rPr lang="en-US" altLang="ja-JP" sz="1400" b="1" dirty="0" err="1">
+                <a:solidFill>
+                  <a:schemeClr val="tx1"/>
+                </a:solidFill>
+                <a:latin typeface="Arial" panose="020B0604020202020204" pitchFamily="34" charset="0"/>
+                <a:cs typeface="Arial" panose="020B0604020202020204" pitchFamily="34" charset="0"/>
+              </a:rPr>
+              <a:t>RockyDataPreprocessing</a:t>
+            </a:r>
+            <a:endParaRPr lang="en-US" altLang="ja-JP" sz="1400" b="1" dirty="0">
+              <a:solidFill>
+                <a:schemeClr val="tx1"/>
+              </a:solidFill>
+              <a:latin typeface="Arial" panose="020B0604020202020204" pitchFamily="34" charset="0"/>
+              <a:cs typeface="Arial" panose="020B0604020202020204" pitchFamily="34" charset="0"/>
+            </a:endParaRPr>
+          </a:p>
+        </p:txBody>
+      </p:sp>
     </p:spTree>
     <p:extLst>
       <p:ext uri="{BB962C8B-B14F-4D97-AF65-F5344CB8AC3E}">

</xml_diff>